<commit_message>
New example.wh, corrected 'do' increment
</commit_message>
<xml_diff>
--- a/Documents/Présentation/Presentation 22-11-16.pptx
+++ b/Documents/Présentation/Presentation 22-11-16.pptx
@@ -105,6 +105,11 @@
       </a:defRPr>
     </a:lvl9pPr>
   </p:defaultTextStyle>
+  <p:extLst>
+    <p:ext uri="{EFAFB233-063F-42B5-8137-9DF3F51BA10A}">
+      <p15:sldGuideLst xmlns:p15="http://schemas.microsoft.com/office/powerpoint/2012/main"/>
+    </p:ext>
+  </p:extLst>
 </p:presentation>
 </file>
 
@@ -3647,6 +3652,41 @@
           </a:fontRef>
         </p:style>
       </p:cxnSp>
+      <p:sp>
+        <p:nvSpPr>
+          <p:cNvPr id="5" name="ZoneTexte 4"/>
+          <p:cNvSpPr txBox="1"/>
+          <p:nvPr/>
+        </p:nvSpPr>
+        <p:spPr>
+          <a:xfrm>
+            <a:off x="1090413" y="5008843"/>
+            <a:ext cx="4705080" cy="400110"/>
+          </a:xfrm>
+          <a:prstGeom prst="rect">
+            <a:avLst/>
+          </a:prstGeom>
+          <a:noFill/>
+        </p:spPr>
+        <p:txBody>
+          <a:bodyPr wrap="square" rtlCol="0">
+            <a:spAutoFit/>
+          </a:bodyPr>
+          <a:lstStyle/>
+          <a:p>
+            <a:pPr>
+              <a:spcAft>
+                <a:spcPts val="1800"/>
+              </a:spcAft>
+            </a:pPr>
+            <a:r>
+              <a:rPr lang="fr-FR" sz="2000" dirty="0" smtClean="0"/>
+              <a:t>--&gt;  Fonction de tests unitaires (Oracle)</a:t>
+            </a:r>
+            <a:endParaRPr lang="fr-FR" sz="2000" dirty="0" smtClean="0"/>
+          </a:p>
+        </p:txBody>
+      </p:sp>
     </p:spTree>
     <p:extLst>
       <p:ext uri="{BB962C8B-B14F-4D97-AF65-F5344CB8AC3E}">

</xml_diff>